<commit_message>
Complete UI/UX redesign with new color scheme and features
- Implemented new color scheme (warm gold #B45309, clean whites, proper contrast)
- Created modern LandingPage_new.js with professional design
- Added AUCTRA SVG logo to public/logo-auctra.svg
- Updated global CSS variables across all components
- Created three separate wallet connection components:
  - AdminWalletConnection (admin-focused design)
  - UserWalletConnection (user-friendly interface)
  - AuctionWalletConnection (bidding-specific features)
- Enhanced Web3Context with multi-wallet support (MetaMask, WalletConnect, Coinbase, Trust)
- Fixed ethers.js v6 compatibility issues
- Updated HTML head with Google Fonts and Font Awesome
- Improved responsive design and accessibility
- Clean Header navigation without wallet connection
- Fixed all ESLint warnings and code quality issues
</commit_message>
<xml_diff>
--- a/auctra.pptx
+++ b/auctra.pptx
@@ -310,7 +310,7 @@
             <a:fld id="{1D8BD707-D9CF-40AE-B4C6-C98DA3205C09}" type="datetimeFigureOut">
               <a:rPr lang="en-US" smtClean="0"/>
               <a:pPr/>
-              <a:t>11/5/2025</a:t>
+              <a:t>11/8/2025</a:t>
             </a:fld>
             <a:endParaRPr lang="en-US"/>
           </a:p>
@@ -475,7 +475,7 @@
             <a:fld id="{1D8BD707-D9CF-40AE-B4C6-C98DA3205C09}" type="datetimeFigureOut">
               <a:rPr lang="en-US" smtClean="0"/>
               <a:pPr/>
-              <a:t>11/5/2025</a:t>
+              <a:t>11/8/2025</a:t>
             </a:fld>
             <a:endParaRPr lang="en-US"/>
           </a:p>
@@ -650,7 +650,7 @@
             <a:fld id="{1D8BD707-D9CF-40AE-B4C6-C98DA3205C09}" type="datetimeFigureOut">
               <a:rPr lang="en-US" smtClean="0"/>
               <a:pPr/>
-              <a:t>11/5/2025</a:t>
+              <a:t>11/8/2025</a:t>
             </a:fld>
             <a:endParaRPr lang="en-US"/>
           </a:p>
@@ -815,7 +815,7 @@
             <a:fld id="{1D8BD707-D9CF-40AE-B4C6-C98DA3205C09}" type="datetimeFigureOut">
               <a:rPr lang="en-US" smtClean="0"/>
               <a:pPr/>
-              <a:t>11/5/2025</a:t>
+              <a:t>11/8/2025</a:t>
             </a:fld>
             <a:endParaRPr lang="en-US"/>
           </a:p>
@@ -1057,7 +1057,7 @@
             <a:fld id="{1D8BD707-D9CF-40AE-B4C6-C98DA3205C09}" type="datetimeFigureOut">
               <a:rPr lang="en-US" smtClean="0"/>
               <a:pPr/>
-              <a:t>11/5/2025</a:t>
+              <a:t>11/8/2025</a:t>
             </a:fld>
             <a:endParaRPr lang="en-US"/>
           </a:p>
@@ -1339,7 +1339,7 @@
             <a:fld id="{1D8BD707-D9CF-40AE-B4C6-C98DA3205C09}" type="datetimeFigureOut">
               <a:rPr lang="en-US" smtClean="0"/>
               <a:pPr/>
-              <a:t>11/5/2025</a:t>
+              <a:t>11/8/2025</a:t>
             </a:fld>
             <a:endParaRPr lang="en-US"/>
           </a:p>
@@ -1755,7 +1755,7 @@
             <a:fld id="{1D8BD707-D9CF-40AE-B4C6-C98DA3205C09}" type="datetimeFigureOut">
               <a:rPr lang="en-US" smtClean="0"/>
               <a:pPr/>
-              <a:t>11/5/2025</a:t>
+              <a:t>11/8/2025</a:t>
             </a:fld>
             <a:endParaRPr lang="en-US"/>
           </a:p>
@@ -1869,7 +1869,7 @@
             <a:fld id="{1D8BD707-D9CF-40AE-B4C6-C98DA3205C09}" type="datetimeFigureOut">
               <a:rPr lang="en-US" smtClean="0"/>
               <a:pPr/>
-              <a:t>11/5/2025</a:t>
+              <a:t>11/8/2025</a:t>
             </a:fld>
             <a:endParaRPr lang="en-US"/>
           </a:p>
@@ -1961,7 +1961,7 @@
             <a:fld id="{1D8BD707-D9CF-40AE-B4C6-C98DA3205C09}" type="datetimeFigureOut">
               <a:rPr lang="en-US" smtClean="0"/>
               <a:pPr/>
-              <a:t>11/5/2025</a:t>
+              <a:t>11/8/2025</a:t>
             </a:fld>
             <a:endParaRPr lang="en-US"/>
           </a:p>
@@ -2233,7 +2233,7 @@
             <a:fld id="{1D8BD707-D9CF-40AE-B4C6-C98DA3205C09}" type="datetimeFigureOut">
               <a:rPr lang="en-US" smtClean="0"/>
               <a:pPr/>
-              <a:t>11/5/2025</a:t>
+              <a:t>11/8/2025</a:t>
             </a:fld>
             <a:endParaRPr lang="en-US"/>
           </a:p>
@@ -2482,7 +2482,7 @@
             <a:fld id="{1D8BD707-D9CF-40AE-B4C6-C98DA3205C09}" type="datetimeFigureOut">
               <a:rPr lang="en-US" smtClean="0"/>
               <a:pPr/>
-              <a:t>11/5/2025</a:t>
+              <a:t>11/8/2025</a:t>
             </a:fld>
             <a:endParaRPr lang="en-US"/>
           </a:p>
@@ -2690,7 +2690,7 @@
             <a:fld id="{1D8BD707-D9CF-40AE-B4C6-C98DA3205C09}" type="datetimeFigureOut">
               <a:rPr lang="en-US" smtClean="0"/>
               <a:pPr/>
-              <a:t>11/5/2025</a:t>
+              <a:t>11/8/2025</a:t>
             </a:fld>
             <a:endParaRPr lang="en-US"/>
           </a:p>
@@ -3322,7 +3322,15 @@
                 <a:latin typeface="Times New Roman" panose="02020603050405020304" pitchFamily="18" charset="0"/>
                 <a:cs typeface="Times New Roman" panose="02020603050405020304" pitchFamily="18" charset="0"/>
               </a:rPr>
-              <a:t>– Click Here</a:t>
+              <a:t>– </a:t>
+            </a:r>
+            <a:r>
+              <a:rPr lang="en-US" sz="3200" dirty="0">
+                <a:latin typeface="Times New Roman" panose="02020603050405020304" pitchFamily="18" charset="0"/>
+                <a:cs typeface="Times New Roman" panose="02020603050405020304" pitchFamily="18" charset="0"/>
+                <a:hlinkClick r:id="rId4"/>
+              </a:rPr>
+              <a:t>Click Here</a:t>
             </a:r>
             <a:endParaRPr lang="en-IN" sz="3200" dirty="0">
               <a:latin typeface="Times New Roman" panose="02020603050405020304" pitchFamily="18" charset="0"/>
@@ -3473,7 +3481,7 @@
           <p:nvPr/>
         </p:nvPicPr>
         <p:blipFill>
-          <a:blip r:embed="rId4">
+          <a:blip r:embed="rId5">
             <a:extLst>
               <a:ext uri="{28A0092B-C50C-407E-A947-70E740481C1C}">
                 <a14:useLocalDpi xmlns:a14="http://schemas.microsoft.com/office/drawing/2010/main" val="0"/>
@@ -3519,7 +3527,7 @@
           <p:nvPr/>
         </p:nvPicPr>
         <p:blipFill>
-          <a:blip r:embed="rId5">
+          <a:blip r:embed="rId6">
             <a:extLst>
               <a:ext uri="{28A0092B-C50C-407E-A947-70E740481C1C}">
                 <a14:useLocalDpi xmlns:a14="http://schemas.microsoft.com/office/drawing/2010/main" val="0"/>

</xml_diff>